<commit_message>
updated SigProf / SigAnalyzer cross comparison ppt
</commit_message>
<xml_diff>
--- a/vignettes/signature-analyzer-sigprofiler-cross-comparision.pptx
+++ b/vignettes/signature-analyzer-sigprofiler-cross-comparision.pptx
@@ -243,7 +243,7 @@
           <a:p>
             <a:fld id="{29A6145C-CDD5-4D46-B3C4-53468D841EF4}" type="datetimeFigureOut">
               <a:rPr lang="en-US" smtClean="0"/>
-              <a:t>2/6/2019</a:t>
+              <a:t>2/7/2019</a:t>
             </a:fld>
             <a:endParaRPr lang="en-US"/>
           </a:p>
@@ -413,7 +413,7 @@
           <a:p>
             <a:fld id="{29A6145C-CDD5-4D46-B3C4-53468D841EF4}" type="datetimeFigureOut">
               <a:rPr lang="en-US" smtClean="0"/>
-              <a:t>2/6/2019</a:t>
+              <a:t>2/7/2019</a:t>
             </a:fld>
             <a:endParaRPr lang="en-US"/>
           </a:p>
@@ -593,7 +593,7 @@
           <a:p>
             <a:fld id="{29A6145C-CDD5-4D46-B3C4-53468D841EF4}" type="datetimeFigureOut">
               <a:rPr lang="en-US" smtClean="0"/>
-              <a:t>2/6/2019</a:t>
+              <a:t>2/7/2019</a:t>
             </a:fld>
             <a:endParaRPr lang="en-US"/>
           </a:p>
@@ -763,7 +763,7 @@
           <a:p>
             <a:fld id="{29A6145C-CDD5-4D46-B3C4-53468D841EF4}" type="datetimeFigureOut">
               <a:rPr lang="en-US" smtClean="0"/>
-              <a:t>2/6/2019</a:t>
+              <a:t>2/7/2019</a:t>
             </a:fld>
             <a:endParaRPr lang="en-US"/>
           </a:p>
@@ -1007,7 +1007,7 @@
           <a:p>
             <a:fld id="{29A6145C-CDD5-4D46-B3C4-53468D841EF4}" type="datetimeFigureOut">
               <a:rPr lang="en-US" smtClean="0"/>
-              <a:t>2/6/2019</a:t>
+              <a:t>2/7/2019</a:t>
             </a:fld>
             <a:endParaRPr lang="en-US"/>
           </a:p>
@@ -1239,7 +1239,7 @@
           <a:p>
             <a:fld id="{29A6145C-CDD5-4D46-B3C4-53468D841EF4}" type="datetimeFigureOut">
               <a:rPr lang="en-US" smtClean="0"/>
-              <a:t>2/6/2019</a:t>
+              <a:t>2/7/2019</a:t>
             </a:fld>
             <a:endParaRPr lang="en-US"/>
           </a:p>
@@ -1606,7 +1606,7 @@
           <a:p>
             <a:fld id="{29A6145C-CDD5-4D46-B3C4-53468D841EF4}" type="datetimeFigureOut">
               <a:rPr lang="en-US" smtClean="0"/>
-              <a:t>2/6/2019</a:t>
+              <a:t>2/7/2019</a:t>
             </a:fld>
             <a:endParaRPr lang="en-US"/>
           </a:p>
@@ -1724,7 +1724,7 @@
           <a:p>
             <a:fld id="{29A6145C-CDD5-4D46-B3C4-53468D841EF4}" type="datetimeFigureOut">
               <a:rPr lang="en-US" smtClean="0"/>
-              <a:t>2/6/2019</a:t>
+              <a:t>2/7/2019</a:t>
             </a:fld>
             <a:endParaRPr lang="en-US"/>
           </a:p>
@@ -1819,7 +1819,7 @@
           <a:p>
             <a:fld id="{29A6145C-CDD5-4D46-B3C4-53468D841EF4}" type="datetimeFigureOut">
               <a:rPr lang="en-US" smtClean="0"/>
-              <a:t>2/6/2019</a:t>
+              <a:t>2/7/2019</a:t>
             </a:fld>
             <a:endParaRPr lang="en-US"/>
           </a:p>
@@ -2096,7 +2096,7 @@
           <a:p>
             <a:fld id="{29A6145C-CDD5-4D46-B3C4-53468D841EF4}" type="datetimeFigureOut">
               <a:rPr lang="en-US" smtClean="0"/>
-              <a:t>2/6/2019</a:t>
+              <a:t>2/7/2019</a:t>
             </a:fld>
             <a:endParaRPr lang="en-US"/>
           </a:p>
@@ -2353,7 +2353,7 @@
           <a:p>
             <a:fld id="{29A6145C-CDD5-4D46-B3C4-53468D841EF4}" type="datetimeFigureOut">
               <a:rPr lang="en-US" smtClean="0"/>
-              <a:t>2/6/2019</a:t>
+              <a:t>2/7/2019</a:t>
             </a:fld>
             <a:endParaRPr lang="en-US"/>
           </a:p>
@@ -2566,7 +2566,7 @@
           <a:p>
             <a:fld id="{29A6145C-CDD5-4D46-B3C4-53468D841EF4}" type="datetimeFigureOut">
               <a:rPr lang="en-US" smtClean="0"/>
-              <a:t>2/6/2019</a:t>
+              <a:t>2/7/2019</a:t>
             </a:fld>
             <a:endParaRPr lang="en-US"/>
           </a:p>
@@ -3039,7 +3039,7 @@
         </p:nvSpPr>
         <p:spPr>
           <a:xfrm>
-            <a:off x="2013727" y="2008543"/>
+            <a:off x="2243389" y="2008543"/>
             <a:ext cx="937517" cy="707886"/>
           </a:xfrm>
           <a:prstGeom prst="rect">
@@ -3158,7 +3158,7 @@
         </p:nvSpPr>
         <p:spPr>
           <a:xfrm>
-            <a:off x="930665" y="2085487"/>
+            <a:off x="1075267" y="2085487"/>
             <a:ext cx="1198659" cy="553998"/>
           </a:xfrm>
           <a:prstGeom prst="rect">
@@ -3187,58 +3187,6 @@
             <a:r>
               <a:rPr lang="en-US" sz="1000" dirty="0" err="1"/>
               <a:t>sa.sa.COMPOSITE</a:t>
-            </a:r>
-            <a:r>
-              <a:rPr lang="en-US" sz="1000" dirty="0"/>
-              <a:t>”</a:t>
-            </a:r>
-          </a:p>
-        </p:txBody>
-      </p:sp>
-      <p:sp>
-        <p:nvSpPr>
-          <p:cNvPr id="11" name="TextBox 10"/>
-          <p:cNvSpPr txBox="1"/>
-          <p:nvPr/>
-        </p:nvSpPr>
-        <p:spPr>
-          <a:xfrm>
-            <a:off x="2762889" y="2085487"/>
-            <a:ext cx="804808" cy="553998"/>
-          </a:xfrm>
-          <a:prstGeom prst="rect">
-            <a:avLst/>
-          </a:prstGeom>
-          <a:noFill/>
-        </p:spPr>
-        <p:txBody>
-          <a:bodyPr wrap="square" rtlCol="0">
-            <a:spAutoFit/>
-          </a:bodyPr>
-          <a:lstStyle/>
-          <a:p>
-            <a:pPr algn="ctr"/>
-            <a:r>
-              <a:rPr lang="en-US" sz="1000" dirty="0"/>
-              <a:t>SigProfiler</a:t>
-            </a:r>
-          </a:p>
-          <a:p>
-            <a:pPr algn="ctr"/>
-            <a:r>
-              <a:rPr lang="en-US" sz="1000" dirty="0"/>
-              <a:t>96-channel</a:t>
-            </a:r>
-          </a:p>
-          <a:p>
-            <a:pPr algn="ctr"/>
-            <a:r>
-              <a:rPr lang="en-US" sz="1000" dirty="0"/>
-              <a:t>“</a:t>
-            </a:r>
-            <a:r>
-              <a:rPr lang="en-US" sz="1000" dirty="0" err="1"/>
-              <a:t>sa.sp</a:t>
             </a:r>
             <a:r>
               <a:rPr lang="en-US" sz="1000" dirty="0"/>
@@ -3415,41 +3363,8 @@
         </p:nvCxnSpPr>
         <p:spPr>
           <a:xfrm>
-            <a:off x="2361356" y="993183"/>
-            <a:ext cx="121126" cy="1015360"/>
-          </a:xfrm>
-          <a:prstGeom prst="line">
-            <a:avLst/>
-          </a:prstGeom>
-        </p:spPr>
-        <p:style>
-          <a:lnRef idx="1">
-            <a:schemeClr val="accent1"/>
-          </a:lnRef>
-          <a:fillRef idx="0">
-            <a:schemeClr val="accent1"/>
-          </a:fillRef>
-          <a:effectRef idx="0">
-            <a:schemeClr val="accent1"/>
-          </a:effectRef>
-          <a:fontRef idx="minor">
-            <a:schemeClr val="tx1"/>
-          </a:fontRef>
-        </p:style>
-      </p:cxnSp>
-      <p:cxnSp>
-        <p:nvCxnSpPr>
-          <p:cNvPr id="21" name="Straight Connector 20"/>
-          <p:cNvCxnSpPr>
-            <a:stCxn id="7" idx="2"/>
-            <a:endCxn id="11" idx="0"/>
-          </p:cNvCxnSpPr>
-          <p:nvPr/>
-        </p:nvCxnSpPr>
-        <p:spPr>
-          <a:xfrm>
-            <a:off x="2361360" y="993183"/>
-            <a:ext cx="803937" cy="1092304"/>
+            <a:off x="2361356" y="993187"/>
+            <a:ext cx="350792" cy="1015356"/>
           </a:xfrm>
           <a:prstGeom prst="line">
             <a:avLst/>
@@ -3481,8 +3396,8 @@
         </p:nvCxnSpPr>
         <p:spPr>
           <a:xfrm flipH="1">
-            <a:off x="1529995" y="993183"/>
-            <a:ext cx="831365" cy="1092304"/>
+            <a:off x="1674597" y="993187"/>
+            <a:ext cx="686759" cy="1092300"/>
           </a:xfrm>
           <a:prstGeom prst="line">
             <a:avLst/>
@@ -3571,36 +3486,6 @@
       </p:cxnSp>
       <p:sp>
         <p:nvSpPr>
-          <p:cNvPr id="29" name="TextBox 28"/>
-          <p:cNvSpPr txBox="1"/>
-          <p:nvPr/>
-        </p:nvSpPr>
-        <p:spPr>
-          <a:xfrm rot="3216091">
-            <a:off x="2254146" y="1315623"/>
-            <a:ext cx="1547301" cy="461280"/>
-          </a:xfrm>
-          <a:prstGeom prst="rect">
-            <a:avLst/>
-          </a:prstGeom>
-          <a:noFill/>
-        </p:spPr>
-        <p:txBody>
-          <a:bodyPr wrap="square" rtlCol="0">
-            <a:spAutoFit/>
-          </a:bodyPr>
-          <a:lstStyle/>
-          <a:p>
-            <a:pPr algn="ctr"/>
-            <a:r>
-              <a:rPr lang="en-US" sz="799" dirty="0"/>
-              <a:t>Match to closest SigProfiler signature, drop 3 Signature-Analyzer profiles</a:t>
-            </a:r>
-          </a:p>
-        </p:txBody>
-      </p:sp>
-      <p:sp>
-        <p:nvSpPr>
           <p:cNvPr id="30" name="TextBox 29"/>
           <p:cNvSpPr txBox="1"/>
           <p:nvPr/>
@@ -3822,7 +3707,7 @@
         </p:nvSpPr>
         <p:spPr>
           <a:xfrm>
-            <a:off x="1348481" y="2749133"/>
+            <a:off x="1493083" y="2749133"/>
             <a:ext cx="365806" cy="369332"/>
           </a:xfrm>
           <a:prstGeom prst="rect">
@@ -3854,7 +3739,7 @@
         </p:nvSpPr>
         <p:spPr>
           <a:xfrm>
-            <a:off x="2281713" y="2749133"/>
+            <a:off x="2511375" y="2749133"/>
             <a:ext cx="365806" cy="369332"/>
           </a:xfrm>
           <a:prstGeom prst="rect">
@@ -3880,14 +3765,14 @@
       </p:sp>
       <p:sp>
         <p:nvSpPr>
-          <p:cNvPr id="56" name="TextBox 55"/>
+          <p:cNvPr id="57" name="TextBox 56"/>
           <p:cNvSpPr txBox="1"/>
           <p:nvPr/>
         </p:nvSpPr>
         <p:spPr>
           <a:xfrm>
-            <a:off x="3022309" y="2749133"/>
-            <a:ext cx="292068" cy="369332"/>
+            <a:off x="3978661" y="2749133"/>
+            <a:ext cx="365806" cy="369332"/>
           </a:xfrm>
           <a:prstGeom prst="rect">
             <a:avLst/>
@@ -3904,7 +3789,7 @@
               <a:rPr lang="en-US" sz="1800" dirty="0">
                 <a:sym typeface="Wingdings" panose="05000000000000000000" pitchFamily="2" charset="2"/>
               </a:rPr>
-              <a:t>?</a:t>
+              <a:t></a:t>
             </a:r>
             <a:endParaRPr lang="en-US" sz="1800" dirty="0"/>
           </a:p>
@@ -3912,13 +3797,13 @@
       </p:sp>
       <p:sp>
         <p:nvSpPr>
-          <p:cNvPr id="57" name="TextBox 56"/>
+          <p:cNvPr id="58" name="TextBox 57"/>
           <p:cNvSpPr txBox="1"/>
           <p:nvPr/>
         </p:nvSpPr>
         <p:spPr>
           <a:xfrm>
-            <a:off x="3978661" y="2749133"/>
+            <a:off x="4896487" y="2749133"/>
             <a:ext cx="365806" cy="369332"/>
           </a:xfrm>
           <a:prstGeom prst="rect">
@@ -3944,45 +3829,13 @@
       </p:sp>
       <p:sp>
         <p:nvSpPr>
-          <p:cNvPr id="58" name="TextBox 57"/>
-          <p:cNvSpPr txBox="1"/>
-          <p:nvPr/>
-        </p:nvSpPr>
-        <p:spPr>
-          <a:xfrm>
-            <a:off x="4896487" y="2749133"/>
-            <a:ext cx="365806" cy="369332"/>
-          </a:xfrm>
-          <a:prstGeom prst="rect">
-            <a:avLst/>
-          </a:prstGeom>
-          <a:noFill/>
-        </p:spPr>
-        <p:txBody>
-          <a:bodyPr wrap="none" rtlCol="0">
-            <a:spAutoFit/>
-          </a:bodyPr>
-          <a:lstStyle/>
-          <a:p>
-            <a:r>
-              <a:rPr lang="en-US" sz="1800" dirty="0">
-                <a:sym typeface="Wingdings" panose="05000000000000000000" pitchFamily="2" charset="2"/>
-              </a:rPr>
-              <a:t></a:t>
-            </a:r>
-            <a:endParaRPr lang="en-US" sz="1800" dirty="0"/>
-          </a:p>
-        </p:txBody>
-      </p:sp>
-      <p:sp>
-        <p:nvSpPr>
           <p:cNvPr id="59" name="TextBox 58"/>
           <p:cNvSpPr txBox="1"/>
           <p:nvPr/>
         </p:nvSpPr>
         <p:spPr>
           <a:xfrm>
-            <a:off x="1349337" y="3212330"/>
+            <a:off x="2510406" y="3212330"/>
             <a:ext cx="365806" cy="369332"/>
           </a:xfrm>
           <a:prstGeom prst="rect">

</xml_diff>